<commit_message>
Add code for after first webinar
</commit_message>
<xml_diff>
--- a/präsentation.pptx
+++ b/präsentation.pptx
@@ -19,7 +19,6 @@
     <p:sldId id="267" r:id="rId13"/>
     <p:sldId id="269" r:id="rId14"/>
     <p:sldId id="271" r:id="rId15"/>
-    <p:sldId id="270" r:id="rId16"/>
   </p:sldIdLst>
   <p:sldSz cx="12192000" cy="6858000"/>
   <p:notesSz cx="6858000" cy="9144000"/>
@@ -118,6 +117,11 @@
       </a:defRPr>
     </a:lvl9pPr>
   </p:defaultTextStyle>
+  <p:extLst>
+    <p:ext uri="{EFAFB233-063F-42B5-8137-9DF3F51BA10A}">
+      <p15:sldGuideLst xmlns:p15="http://schemas.microsoft.com/office/powerpoint/2012/main"/>
+    </p:ext>
+  </p:extLst>
 </p:presentation>
 </file>
 
@@ -5741,918 +5745,6 @@
 </p:sld>
 </file>
 
-<file path=ppt/slides/slide15.xml><?xml version="1.0" encoding="utf-8"?>
-<p:sld xmlns:a="http://schemas.openxmlformats.org/drawingml/2006/main" xmlns:r="http://schemas.openxmlformats.org/officeDocument/2006/relationships" xmlns:p="http://schemas.openxmlformats.org/presentationml/2006/main" show="0">
-  <p:cSld>
-    <p:spTree>
-      <p:nvGrpSpPr>
-        <p:cNvPr id="1" name=""/>
-        <p:cNvGrpSpPr/>
-        <p:nvPr/>
-      </p:nvGrpSpPr>
-      <p:grpSpPr>
-        <a:xfrm>
-          <a:off x="0" y="0"/>
-          <a:ext cx="0" cy="0"/>
-          <a:chOff x="0" y="0"/>
-          <a:chExt cx="0" cy="0"/>
-        </a:xfrm>
-      </p:grpSpPr>
-      <p:sp>
-        <p:nvSpPr>
-          <p:cNvPr id="12" name="Date Placeholder 3">
-            <a:extLst>
-              <a:ext uri="{FF2B5EF4-FFF2-40B4-BE49-F238E27FC236}">
-                <a16:creationId xmlns:a16="http://schemas.microsoft.com/office/drawing/2014/main" id="{D36BA725-387F-40B7-9F74-3075E59879C5}"/>
-              </a:ext>
-            </a:extLst>
-          </p:cNvPr>
-          <p:cNvSpPr txBox="1">
-            <a:spLocks/>
-          </p:cNvSpPr>
-          <p:nvPr/>
-        </p:nvSpPr>
-        <p:spPr>
-          <a:xfrm>
-            <a:off x="838200" y="6356350"/>
-            <a:ext cx="2743200" cy="365125"/>
-          </a:xfrm>
-          <a:prstGeom prst="rect">
-            <a:avLst/>
-          </a:prstGeom>
-        </p:spPr>
-        <p:txBody>
-          <a:bodyPr vert="horz" lIns="91440" tIns="45720" rIns="91440" bIns="45720" rtlCol="0" anchor="ctr"/>
-          <a:lstStyle>
-            <a:defPPr>
-              <a:defRPr lang="de-DE"/>
-            </a:defPPr>
-            <a:lvl1pPr marL="0" algn="l" defTabSz="914400" rtl="0" eaLnBrk="1" latinLnBrk="0" hangingPunct="1">
-              <a:defRPr sz="1200" kern="1200">
-                <a:solidFill>
-                  <a:schemeClr val="accent1"/>
-                </a:solidFill>
-                <a:latin typeface="Klavika Light" panose="020B0506040000020004" pitchFamily="34" charset="0"/>
-                <a:ea typeface="+mn-ea"/>
-                <a:cs typeface="+mn-cs"/>
-              </a:defRPr>
-            </a:lvl1pPr>
-            <a:lvl2pPr marL="457200" algn="l" defTabSz="914400" rtl="0" eaLnBrk="1" latinLnBrk="0" hangingPunct="1">
-              <a:defRPr sz="1800" kern="1200">
-                <a:solidFill>
-                  <a:schemeClr val="tx1"/>
-                </a:solidFill>
-                <a:latin typeface="+mn-lt"/>
-                <a:ea typeface="+mn-ea"/>
-                <a:cs typeface="+mn-cs"/>
-              </a:defRPr>
-            </a:lvl2pPr>
-            <a:lvl3pPr marL="914400" algn="l" defTabSz="914400" rtl="0" eaLnBrk="1" latinLnBrk="0" hangingPunct="1">
-              <a:defRPr sz="1800" kern="1200">
-                <a:solidFill>
-                  <a:schemeClr val="tx1"/>
-                </a:solidFill>
-                <a:latin typeface="+mn-lt"/>
-                <a:ea typeface="+mn-ea"/>
-                <a:cs typeface="+mn-cs"/>
-              </a:defRPr>
-            </a:lvl3pPr>
-            <a:lvl4pPr marL="1371600" algn="l" defTabSz="914400" rtl="0" eaLnBrk="1" latinLnBrk="0" hangingPunct="1">
-              <a:defRPr sz="1800" kern="1200">
-                <a:solidFill>
-                  <a:schemeClr val="tx1"/>
-                </a:solidFill>
-                <a:latin typeface="+mn-lt"/>
-                <a:ea typeface="+mn-ea"/>
-                <a:cs typeface="+mn-cs"/>
-              </a:defRPr>
-            </a:lvl4pPr>
-            <a:lvl5pPr marL="1828800" algn="l" defTabSz="914400" rtl="0" eaLnBrk="1" latinLnBrk="0" hangingPunct="1">
-              <a:defRPr sz="1800" kern="1200">
-                <a:solidFill>
-                  <a:schemeClr val="tx1"/>
-                </a:solidFill>
-                <a:latin typeface="+mn-lt"/>
-                <a:ea typeface="+mn-ea"/>
-                <a:cs typeface="+mn-cs"/>
-              </a:defRPr>
-            </a:lvl5pPr>
-            <a:lvl6pPr marL="2286000" algn="l" defTabSz="914400" rtl="0" eaLnBrk="1" latinLnBrk="0" hangingPunct="1">
-              <a:defRPr sz="1800" kern="1200">
-                <a:solidFill>
-                  <a:schemeClr val="tx1"/>
-                </a:solidFill>
-                <a:latin typeface="+mn-lt"/>
-                <a:ea typeface="+mn-ea"/>
-                <a:cs typeface="+mn-cs"/>
-              </a:defRPr>
-            </a:lvl6pPr>
-            <a:lvl7pPr marL="2743200" algn="l" defTabSz="914400" rtl="0" eaLnBrk="1" latinLnBrk="0" hangingPunct="1">
-              <a:defRPr sz="1800" kern="1200">
-                <a:solidFill>
-                  <a:schemeClr val="tx1"/>
-                </a:solidFill>
-                <a:latin typeface="+mn-lt"/>
-                <a:ea typeface="+mn-ea"/>
-                <a:cs typeface="+mn-cs"/>
-              </a:defRPr>
-            </a:lvl7pPr>
-            <a:lvl8pPr marL="3200400" algn="l" defTabSz="914400" rtl="0" eaLnBrk="1" latinLnBrk="0" hangingPunct="1">
-              <a:defRPr sz="1800" kern="1200">
-                <a:solidFill>
-                  <a:schemeClr val="tx1"/>
-                </a:solidFill>
-                <a:latin typeface="+mn-lt"/>
-                <a:ea typeface="+mn-ea"/>
-                <a:cs typeface="+mn-cs"/>
-              </a:defRPr>
-            </a:lvl8pPr>
-            <a:lvl9pPr marL="3657600" algn="l" defTabSz="914400" rtl="0" eaLnBrk="1" latinLnBrk="0" hangingPunct="1">
-              <a:defRPr sz="1800" kern="1200">
-                <a:solidFill>
-                  <a:schemeClr val="tx1"/>
-                </a:solidFill>
-                <a:latin typeface="+mn-lt"/>
-                <a:ea typeface="+mn-ea"/>
-                <a:cs typeface="+mn-cs"/>
-              </a:defRPr>
-            </a:lvl9pPr>
-          </a:lstStyle>
-          <a:p>
-            <a:r>
-              <a:rPr lang="de-DE" dirty="0"/>
-              <a:t>     @andrewgreenh</a:t>
-            </a:r>
-          </a:p>
-        </p:txBody>
-      </p:sp>
-      <p:sp>
-        <p:nvSpPr>
-          <p:cNvPr id="13" name="Slide Number Placeholder 5">
-            <a:extLst>
-              <a:ext uri="{FF2B5EF4-FFF2-40B4-BE49-F238E27FC236}">
-                <a16:creationId xmlns:a16="http://schemas.microsoft.com/office/drawing/2014/main" id="{DC2A0686-3B77-4E2F-B687-E8D25337CAFB}"/>
-              </a:ext>
-            </a:extLst>
-          </p:cNvPr>
-          <p:cNvSpPr txBox="1">
-            <a:spLocks/>
-          </p:cNvSpPr>
-          <p:nvPr/>
-        </p:nvSpPr>
-        <p:spPr>
-          <a:xfrm>
-            <a:off x="8610600" y="6356350"/>
-            <a:ext cx="2743200" cy="365125"/>
-          </a:xfrm>
-          <a:prstGeom prst="rect">
-            <a:avLst/>
-          </a:prstGeom>
-        </p:spPr>
-        <p:txBody>
-          <a:bodyPr vert="horz" lIns="91440" tIns="45720" rIns="91440" bIns="45720" rtlCol="0" anchor="ctr"/>
-          <a:lstStyle>
-            <a:defPPr>
-              <a:defRPr lang="de-DE"/>
-            </a:defPPr>
-            <a:lvl1pPr marL="0" algn="r" defTabSz="914400" rtl="0" eaLnBrk="1" latinLnBrk="0" hangingPunct="1">
-              <a:defRPr sz="1200" b="0" kern="1200">
-                <a:solidFill>
-                  <a:schemeClr val="accent1"/>
-                </a:solidFill>
-                <a:latin typeface="Klavika Light" panose="020B0506040000020004" pitchFamily="34" charset="0"/>
-                <a:ea typeface="+mn-ea"/>
-                <a:cs typeface="+mn-cs"/>
-              </a:defRPr>
-            </a:lvl1pPr>
-            <a:lvl2pPr marL="457200" algn="l" defTabSz="914400" rtl="0" eaLnBrk="1" latinLnBrk="0" hangingPunct="1">
-              <a:defRPr sz="1800" kern="1200">
-                <a:solidFill>
-                  <a:schemeClr val="tx1"/>
-                </a:solidFill>
-                <a:latin typeface="+mn-lt"/>
-                <a:ea typeface="+mn-ea"/>
-                <a:cs typeface="+mn-cs"/>
-              </a:defRPr>
-            </a:lvl2pPr>
-            <a:lvl3pPr marL="914400" algn="l" defTabSz="914400" rtl="0" eaLnBrk="1" latinLnBrk="0" hangingPunct="1">
-              <a:defRPr sz="1800" kern="1200">
-                <a:solidFill>
-                  <a:schemeClr val="tx1"/>
-                </a:solidFill>
-                <a:latin typeface="+mn-lt"/>
-                <a:ea typeface="+mn-ea"/>
-                <a:cs typeface="+mn-cs"/>
-              </a:defRPr>
-            </a:lvl3pPr>
-            <a:lvl4pPr marL="1371600" algn="l" defTabSz="914400" rtl="0" eaLnBrk="1" latinLnBrk="0" hangingPunct="1">
-              <a:defRPr sz="1800" kern="1200">
-                <a:solidFill>
-                  <a:schemeClr val="tx1"/>
-                </a:solidFill>
-                <a:latin typeface="+mn-lt"/>
-                <a:ea typeface="+mn-ea"/>
-                <a:cs typeface="+mn-cs"/>
-              </a:defRPr>
-            </a:lvl4pPr>
-            <a:lvl5pPr marL="1828800" algn="l" defTabSz="914400" rtl="0" eaLnBrk="1" latinLnBrk="0" hangingPunct="1">
-              <a:defRPr sz="1800" kern="1200">
-                <a:solidFill>
-                  <a:schemeClr val="tx1"/>
-                </a:solidFill>
-                <a:latin typeface="+mn-lt"/>
-                <a:ea typeface="+mn-ea"/>
-                <a:cs typeface="+mn-cs"/>
-              </a:defRPr>
-            </a:lvl5pPr>
-            <a:lvl6pPr marL="2286000" algn="l" defTabSz="914400" rtl="0" eaLnBrk="1" latinLnBrk="0" hangingPunct="1">
-              <a:defRPr sz="1800" kern="1200">
-                <a:solidFill>
-                  <a:schemeClr val="tx1"/>
-                </a:solidFill>
-                <a:latin typeface="+mn-lt"/>
-                <a:ea typeface="+mn-ea"/>
-                <a:cs typeface="+mn-cs"/>
-              </a:defRPr>
-            </a:lvl6pPr>
-            <a:lvl7pPr marL="2743200" algn="l" defTabSz="914400" rtl="0" eaLnBrk="1" latinLnBrk="0" hangingPunct="1">
-              <a:defRPr sz="1800" kern="1200">
-                <a:solidFill>
-                  <a:schemeClr val="tx1"/>
-                </a:solidFill>
-                <a:latin typeface="+mn-lt"/>
-                <a:ea typeface="+mn-ea"/>
-                <a:cs typeface="+mn-cs"/>
-              </a:defRPr>
-            </a:lvl7pPr>
-            <a:lvl8pPr marL="3200400" algn="l" defTabSz="914400" rtl="0" eaLnBrk="1" latinLnBrk="0" hangingPunct="1">
-              <a:defRPr sz="1800" kern="1200">
-                <a:solidFill>
-                  <a:schemeClr val="tx1"/>
-                </a:solidFill>
-                <a:latin typeface="+mn-lt"/>
-                <a:ea typeface="+mn-ea"/>
-                <a:cs typeface="+mn-cs"/>
-              </a:defRPr>
-            </a:lvl8pPr>
-            <a:lvl9pPr marL="3657600" algn="l" defTabSz="914400" rtl="0" eaLnBrk="1" latinLnBrk="0" hangingPunct="1">
-              <a:defRPr sz="1800" kern="1200">
-                <a:solidFill>
-                  <a:schemeClr val="tx1"/>
-                </a:solidFill>
-                <a:latin typeface="+mn-lt"/>
-                <a:ea typeface="+mn-ea"/>
-                <a:cs typeface="+mn-cs"/>
-              </a:defRPr>
-            </a:lvl9pPr>
-          </a:lstStyle>
-          <a:p>
-            <a:r>
-              <a:rPr lang="de-DE" dirty="0"/>
-              <a:t>academy.esveo.com</a:t>
-            </a:r>
-          </a:p>
-        </p:txBody>
-      </p:sp>
-      <p:pic>
-        <p:nvPicPr>
-          <p:cNvPr id="14" name="Graphic 13">
-            <a:extLst>
-              <a:ext uri="{FF2B5EF4-FFF2-40B4-BE49-F238E27FC236}">
-                <a16:creationId xmlns:a16="http://schemas.microsoft.com/office/drawing/2014/main" id="{5EFA2FC8-8DFD-4C47-B392-D793EC769ACA}"/>
-              </a:ext>
-            </a:extLst>
-          </p:cNvPr>
-          <p:cNvPicPr>
-            <a:picLocks noChangeAspect="1"/>
-          </p:cNvPicPr>
-          <p:nvPr/>
-        </p:nvPicPr>
-        <p:blipFill>
-          <a:blip r:embed="rId2">
-            <a:extLst>
-              <a:ext uri="{28A0092B-C50C-407E-A947-70E740481C1C}">
-                <a14:useLocalDpi xmlns:a14="http://schemas.microsoft.com/office/drawing/2010/main" val="0"/>
-              </a:ext>
-              <a:ext uri="{96DAC541-7B7A-43D3-8B79-37D633B846F1}">
-                <asvg:svgBlip xmlns:asvg="http://schemas.microsoft.com/office/drawing/2016/SVG/main" r:embed="rId3"/>
-              </a:ext>
-            </a:extLst>
-          </a:blip>
-          <a:stretch>
-            <a:fillRect/>
-          </a:stretch>
-        </p:blipFill>
-        <p:spPr>
-          <a:xfrm>
-            <a:off x="838200" y="6435997"/>
-            <a:ext cx="205829" cy="205829"/>
-          </a:xfrm>
-          <a:prstGeom prst="rect">
-            <a:avLst/>
-          </a:prstGeom>
-        </p:spPr>
-      </p:pic>
-      <p:sp>
-        <p:nvSpPr>
-          <p:cNvPr id="15" name="TextBox 14">
-            <a:extLst>
-              <a:ext uri="{FF2B5EF4-FFF2-40B4-BE49-F238E27FC236}">
-                <a16:creationId xmlns:a16="http://schemas.microsoft.com/office/drawing/2014/main" id="{E6309D2F-C03F-4D0C-8437-E0A5B4B6830C}"/>
-              </a:ext>
-            </a:extLst>
-          </p:cNvPr>
-          <p:cNvSpPr txBox="1"/>
-          <p:nvPr/>
-        </p:nvSpPr>
-        <p:spPr>
-          <a:xfrm>
-            <a:off x="838200" y="302288"/>
-            <a:ext cx="9875520" cy="769441"/>
-          </a:xfrm>
-          <a:prstGeom prst="rect">
-            <a:avLst/>
-          </a:prstGeom>
-          <a:noFill/>
-        </p:spPr>
-        <p:txBody>
-          <a:bodyPr wrap="square" rtlCol="0">
-            <a:spAutoFit/>
-          </a:bodyPr>
-          <a:lstStyle/>
-          <a:p>
-            <a:r>
-              <a:rPr lang="de-DE" sz="4400" b="1" kern="900" dirty="0">
-                <a:gradFill flip="none" rotWithShape="1">
-                  <a:gsLst>
-                    <a:gs pos="0">
-                      <a:srgbClr val="00B0F0"/>
-                    </a:gs>
-                    <a:gs pos="100000">
-                      <a:schemeClr val="accent6"/>
-                    </a:gs>
-                  </a:gsLst>
-                  <a:lin ang="2700000" scaled="1"/>
-                  <a:tileRect/>
-                </a:gradFill>
-                <a:latin typeface="Klavika Light" panose="020B0506040000020004" pitchFamily="34" charset="0"/>
-              </a:rPr>
-              <a:t>Wie geht es weiter?</a:t>
-            </a:r>
-          </a:p>
-        </p:txBody>
-      </p:sp>
-      <p:grpSp>
-        <p:nvGrpSpPr>
-          <p:cNvPr id="8" name="Group 7">
-            <a:extLst>
-              <a:ext uri="{FF2B5EF4-FFF2-40B4-BE49-F238E27FC236}">
-                <a16:creationId xmlns:a16="http://schemas.microsoft.com/office/drawing/2014/main" id="{863267B7-BFBA-46EB-9D72-099B99CC8F98}"/>
-              </a:ext>
-            </a:extLst>
-          </p:cNvPr>
-          <p:cNvGrpSpPr/>
-          <p:nvPr/>
-        </p:nvGrpSpPr>
-        <p:grpSpPr>
-          <a:xfrm>
-            <a:off x="838200" y="1593336"/>
-            <a:ext cx="3314522" cy="910646"/>
-            <a:chOff x="404038" y="1649674"/>
-            <a:chExt cx="3314522" cy="910646"/>
-          </a:xfrm>
-        </p:grpSpPr>
-        <p:cxnSp>
-          <p:nvCxnSpPr>
-            <p:cNvPr id="4" name="Straight Connector 3">
-              <a:extLst>
-                <a:ext uri="{FF2B5EF4-FFF2-40B4-BE49-F238E27FC236}">
-                  <a16:creationId xmlns:a16="http://schemas.microsoft.com/office/drawing/2014/main" id="{FFD67892-5665-44A6-82B1-758B5D106BDB}"/>
-                </a:ext>
-              </a:extLst>
-            </p:cNvPr>
-            <p:cNvCxnSpPr>
-              <a:cxnSpLocks/>
-            </p:cNvCxnSpPr>
-            <p:nvPr/>
-          </p:nvCxnSpPr>
-          <p:spPr>
-            <a:xfrm>
-              <a:off x="404038" y="2560320"/>
-              <a:ext cx="3314522" cy="0"/>
-            </a:xfrm>
-            <a:prstGeom prst="line">
-              <a:avLst/>
-            </a:prstGeom>
-            <a:ln w="53975">
-              <a:gradFill flip="none" rotWithShape="1">
-                <a:gsLst>
-                  <a:gs pos="0">
-                    <a:schemeClr val="accent1"/>
-                  </a:gs>
-                  <a:gs pos="100000">
-                    <a:schemeClr val="accent6"/>
-                  </a:gs>
-                </a:gsLst>
-                <a:lin ang="0" scaled="1"/>
-                <a:tileRect/>
-              </a:gradFill>
-            </a:ln>
-          </p:spPr>
-          <p:style>
-            <a:lnRef idx="1">
-              <a:schemeClr val="accent1"/>
-            </a:lnRef>
-            <a:fillRef idx="0">
-              <a:schemeClr val="accent1"/>
-            </a:fillRef>
-            <a:effectRef idx="0">
-              <a:schemeClr val="accent1"/>
-            </a:effectRef>
-            <a:fontRef idx="minor">
-              <a:schemeClr val="tx1"/>
-            </a:fontRef>
-          </p:style>
-        </p:cxnSp>
-        <p:sp>
-          <p:nvSpPr>
-            <p:cNvPr id="10" name="TextBox 9">
-              <a:extLst>
-                <a:ext uri="{FF2B5EF4-FFF2-40B4-BE49-F238E27FC236}">
-                  <a16:creationId xmlns:a16="http://schemas.microsoft.com/office/drawing/2014/main" id="{06CB1DEF-87B1-4510-B4D0-0601F7C5DD38}"/>
-                </a:ext>
-              </a:extLst>
-            </p:cNvPr>
-            <p:cNvSpPr txBox="1"/>
-            <p:nvPr/>
-          </p:nvSpPr>
-          <p:spPr>
-            <a:xfrm>
-              <a:off x="404038" y="1649674"/>
-              <a:ext cx="3314522" cy="830990"/>
-            </a:xfrm>
-            <a:prstGeom prst="rect">
-              <a:avLst/>
-            </a:prstGeom>
-            <a:noFill/>
-          </p:spPr>
-          <p:txBody>
-            <a:bodyPr wrap="square" rtlCol="0" anchor="b">
-              <a:noAutofit/>
-            </a:bodyPr>
-            <a:lstStyle/>
-            <a:p>
-              <a:pPr algn="ctr">
-                <a:spcAft>
-                  <a:spcPts val="1200"/>
-                </a:spcAft>
-                <a:buClr>
-                  <a:schemeClr val="accent1"/>
-                </a:buClr>
-              </a:pPr>
-              <a:r>
-                <a:rPr lang="de-DE" sz="2400" dirty="0">
-                  <a:solidFill>
-                    <a:schemeClr val="bg1"/>
-                  </a:solidFill>
-                  <a:latin typeface="Klavika Light" panose="020B0506040000020004" pitchFamily="34" charset="0"/>
-                </a:rPr>
-                <a:t>Evaluationsworkshop</a:t>
-              </a:r>
-            </a:p>
-          </p:txBody>
-        </p:sp>
-      </p:grpSp>
-      <p:grpSp>
-        <p:nvGrpSpPr>
-          <p:cNvPr id="7" name="Group 6">
-            <a:extLst>
-              <a:ext uri="{FF2B5EF4-FFF2-40B4-BE49-F238E27FC236}">
-                <a16:creationId xmlns:a16="http://schemas.microsoft.com/office/drawing/2014/main" id="{CA618E44-3D13-4963-A13F-7DC16675510D}"/>
-              </a:ext>
-            </a:extLst>
-          </p:cNvPr>
-          <p:cNvGrpSpPr/>
-          <p:nvPr/>
-        </p:nvGrpSpPr>
-        <p:grpSpPr>
-          <a:xfrm>
-            <a:off x="4438739" y="1593336"/>
-            <a:ext cx="3314522" cy="910646"/>
-            <a:chOff x="4252138" y="1649674"/>
-            <a:chExt cx="3314522" cy="910646"/>
-          </a:xfrm>
-        </p:grpSpPr>
-        <p:cxnSp>
-          <p:nvCxnSpPr>
-            <p:cNvPr id="16" name="Straight Connector 15">
-              <a:extLst>
-                <a:ext uri="{FF2B5EF4-FFF2-40B4-BE49-F238E27FC236}">
-                  <a16:creationId xmlns:a16="http://schemas.microsoft.com/office/drawing/2014/main" id="{EAB1315C-ED45-456D-B5ED-1CCD584DDD41}"/>
-                </a:ext>
-              </a:extLst>
-            </p:cNvPr>
-            <p:cNvCxnSpPr>
-              <a:cxnSpLocks/>
-            </p:cNvCxnSpPr>
-            <p:nvPr/>
-          </p:nvCxnSpPr>
-          <p:spPr>
-            <a:xfrm>
-              <a:off x="4252138" y="2560320"/>
-              <a:ext cx="3314522" cy="0"/>
-            </a:xfrm>
-            <a:prstGeom prst="line">
-              <a:avLst/>
-            </a:prstGeom>
-            <a:ln w="53975">
-              <a:gradFill flip="none" rotWithShape="1">
-                <a:gsLst>
-                  <a:gs pos="0">
-                    <a:schemeClr val="accent1"/>
-                  </a:gs>
-                  <a:gs pos="100000">
-                    <a:schemeClr val="accent6"/>
-                  </a:gs>
-                </a:gsLst>
-                <a:lin ang="0" scaled="1"/>
-                <a:tileRect/>
-              </a:gradFill>
-            </a:ln>
-          </p:spPr>
-          <p:style>
-            <a:lnRef idx="1">
-              <a:schemeClr val="accent1"/>
-            </a:lnRef>
-            <a:fillRef idx="0">
-              <a:schemeClr val="accent1"/>
-            </a:fillRef>
-            <a:effectRef idx="0">
-              <a:schemeClr val="accent1"/>
-            </a:effectRef>
-            <a:fontRef idx="minor">
-              <a:schemeClr val="tx1"/>
-            </a:fontRef>
-          </p:style>
-        </p:cxnSp>
-        <p:sp>
-          <p:nvSpPr>
-            <p:cNvPr id="17" name="TextBox 16">
-              <a:extLst>
-                <a:ext uri="{FF2B5EF4-FFF2-40B4-BE49-F238E27FC236}">
-                  <a16:creationId xmlns:a16="http://schemas.microsoft.com/office/drawing/2014/main" id="{8EC1171F-4414-4FD8-957C-990DC49671A1}"/>
-                </a:ext>
-              </a:extLst>
-            </p:cNvPr>
-            <p:cNvSpPr txBox="1"/>
-            <p:nvPr/>
-          </p:nvSpPr>
-          <p:spPr>
-            <a:xfrm>
-              <a:off x="4252138" y="1649674"/>
-              <a:ext cx="3314522" cy="830997"/>
-            </a:xfrm>
-            <a:prstGeom prst="rect">
-              <a:avLst/>
-            </a:prstGeom>
-            <a:noFill/>
-          </p:spPr>
-          <p:txBody>
-            <a:bodyPr wrap="square" rtlCol="0" anchor="b">
-              <a:noAutofit/>
-            </a:bodyPr>
-            <a:lstStyle/>
-            <a:p>
-              <a:pPr algn="ctr">
-                <a:spcAft>
-                  <a:spcPts val="1200"/>
-                </a:spcAft>
-                <a:buClr>
-                  <a:schemeClr val="accent1"/>
-                </a:buClr>
-              </a:pPr>
-              <a:r>
-                <a:rPr lang="de-DE" sz="2400" dirty="0">
-                  <a:solidFill>
-                    <a:schemeClr val="bg1"/>
-                  </a:solidFill>
-                  <a:latin typeface="Klavika Light" panose="020B0506040000020004" pitchFamily="34" charset="0"/>
-                </a:rPr>
-                <a:t>Single Page Apps</a:t>
-              </a:r>
-              <a:br>
-                <a:rPr lang="de-DE" sz="2400" dirty="0">
-                  <a:solidFill>
-                    <a:schemeClr val="bg1"/>
-                  </a:solidFill>
-                  <a:latin typeface="Klavika Light" panose="020B0506040000020004" pitchFamily="34" charset="0"/>
-                </a:rPr>
-              </a:br>
-              <a:r>
-                <a:rPr lang="de-DE" sz="2400" dirty="0">
-                  <a:solidFill>
-                    <a:schemeClr val="bg1"/>
-                  </a:solidFill>
-                  <a:latin typeface="Klavika Light" panose="020B0506040000020004" pitchFamily="34" charset="0"/>
-                </a:rPr>
-                <a:t>(CSR, SSR &amp; Native)</a:t>
-              </a:r>
-            </a:p>
-          </p:txBody>
-        </p:sp>
-      </p:grpSp>
-      <p:grpSp>
-        <p:nvGrpSpPr>
-          <p:cNvPr id="6" name="Group 5">
-            <a:extLst>
-              <a:ext uri="{FF2B5EF4-FFF2-40B4-BE49-F238E27FC236}">
-                <a16:creationId xmlns:a16="http://schemas.microsoft.com/office/drawing/2014/main" id="{7D7ECD58-3D8C-4207-A735-03DB6572EB27}"/>
-              </a:ext>
-            </a:extLst>
-          </p:cNvPr>
-          <p:cNvGrpSpPr/>
-          <p:nvPr/>
-        </p:nvGrpSpPr>
-        <p:grpSpPr>
-          <a:xfrm>
-            <a:off x="8039278" y="1593336"/>
-            <a:ext cx="3314522" cy="910646"/>
-            <a:chOff x="8157299" y="1649674"/>
-            <a:chExt cx="3314522" cy="910646"/>
-          </a:xfrm>
-        </p:grpSpPr>
-        <p:cxnSp>
-          <p:nvCxnSpPr>
-            <p:cNvPr id="19" name="Straight Connector 18">
-              <a:extLst>
-                <a:ext uri="{FF2B5EF4-FFF2-40B4-BE49-F238E27FC236}">
-                  <a16:creationId xmlns:a16="http://schemas.microsoft.com/office/drawing/2014/main" id="{5D3C433E-EB44-4966-8A2A-C3CFF605374B}"/>
-                </a:ext>
-              </a:extLst>
-            </p:cNvPr>
-            <p:cNvCxnSpPr>
-              <a:cxnSpLocks/>
-            </p:cNvCxnSpPr>
-            <p:nvPr/>
-          </p:nvCxnSpPr>
-          <p:spPr>
-            <a:xfrm>
-              <a:off x="8157299" y="2560320"/>
-              <a:ext cx="3314522" cy="0"/>
-            </a:xfrm>
-            <a:prstGeom prst="line">
-              <a:avLst/>
-            </a:prstGeom>
-            <a:ln w="53975">
-              <a:gradFill flip="none" rotWithShape="1">
-                <a:gsLst>
-                  <a:gs pos="0">
-                    <a:schemeClr val="accent1"/>
-                  </a:gs>
-                  <a:gs pos="100000">
-                    <a:schemeClr val="accent6"/>
-                  </a:gs>
-                </a:gsLst>
-                <a:lin ang="0" scaled="1"/>
-                <a:tileRect/>
-              </a:gradFill>
-            </a:ln>
-          </p:spPr>
-          <p:style>
-            <a:lnRef idx="1">
-              <a:schemeClr val="accent1"/>
-            </a:lnRef>
-            <a:fillRef idx="0">
-              <a:schemeClr val="accent1"/>
-            </a:fillRef>
-            <a:effectRef idx="0">
-              <a:schemeClr val="accent1"/>
-            </a:effectRef>
-            <a:fontRef idx="minor">
-              <a:schemeClr val="tx1"/>
-            </a:fontRef>
-          </p:style>
-        </p:cxnSp>
-        <p:sp>
-          <p:nvSpPr>
-            <p:cNvPr id="20" name="TextBox 19">
-              <a:extLst>
-                <a:ext uri="{FF2B5EF4-FFF2-40B4-BE49-F238E27FC236}">
-                  <a16:creationId xmlns:a16="http://schemas.microsoft.com/office/drawing/2014/main" id="{FCC65AA7-64C1-4A35-9AB9-35D6BBE5C77A}"/>
-                </a:ext>
-              </a:extLst>
-            </p:cNvPr>
-            <p:cNvSpPr txBox="1"/>
-            <p:nvPr/>
-          </p:nvSpPr>
-          <p:spPr>
-            <a:xfrm>
-              <a:off x="8157299" y="1649674"/>
-              <a:ext cx="3314522" cy="830997"/>
-            </a:xfrm>
-            <a:prstGeom prst="rect">
-              <a:avLst/>
-            </a:prstGeom>
-            <a:noFill/>
-          </p:spPr>
-          <p:txBody>
-            <a:bodyPr wrap="square" rtlCol="0" anchor="b">
-              <a:noAutofit/>
-            </a:bodyPr>
-            <a:lstStyle/>
-            <a:p>
-              <a:pPr algn="ctr">
-                <a:spcAft>
-                  <a:spcPts val="1200"/>
-                </a:spcAft>
-                <a:buClr>
-                  <a:schemeClr val="accent1"/>
-                </a:buClr>
-              </a:pPr>
-              <a:r>
-                <a:rPr lang="de-DE" sz="2400" dirty="0">
-                  <a:solidFill>
-                    <a:schemeClr val="bg1"/>
-                  </a:solidFill>
-                  <a:latin typeface="Klavika Light" panose="020B0506040000020004" pitchFamily="34" charset="0"/>
-                </a:rPr>
-                <a:t>Enterprise-Apps mit Micro </a:t>
-              </a:r>
-              <a:r>
-                <a:rPr lang="de-DE" sz="2400" dirty="0" err="1">
-                  <a:solidFill>
-                    <a:schemeClr val="bg1"/>
-                  </a:solidFill>
-                  <a:latin typeface="Klavika Light" panose="020B0506040000020004" pitchFamily="34" charset="0"/>
-                </a:rPr>
-                <a:t>Frontends</a:t>
-              </a:r>
-              <a:endParaRPr lang="de-DE" sz="2400" dirty="0">
-                <a:solidFill>
-                  <a:schemeClr val="bg1"/>
-                </a:solidFill>
-                <a:latin typeface="Klavika Light" panose="020B0506040000020004" pitchFamily="34" charset="0"/>
-              </a:endParaRPr>
-            </a:p>
-          </p:txBody>
-        </p:sp>
-      </p:grpSp>
-      <p:sp>
-        <p:nvSpPr>
-          <p:cNvPr id="18" name="TextBox 17">
-            <a:extLst>
-              <a:ext uri="{FF2B5EF4-FFF2-40B4-BE49-F238E27FC236}">
-                <a16:creationId xmlns:a16="http://schemas.microsoft.com/office/drawing/2014/main" id="{6BB6D3CA-02AF-43E0-BEE9-C2A9B4BFA3CD}"/>
-              </a:ext>
-            </a:extLst>
-          </p:cNvPr>
-          <p:cNvSpPr txBox="1"/>
-          <p:nvPr/>
-        </p:nvSpPr>
-        <p:spPr>
-          <a:xfrm>
-            <a:off x="838200" y="2769510"/>
-            <a:ext cx="3314522" cy="2246769"/>
-          </a:xfrm>
-          <a:prstGeom prst="rect">
-            <a:avLst/>
-          </a:prstGeom>
-          <a:noFill/>
-        </p:spPr>
-        <p:txBody>
-          <a:bodyPr wrap="square" rtlCol="0">
-            <a:spAutoFit/>
-          </a:bodyPr>
-          <a:lstStyle/>
-          <a:p>
-            <a:pPr marL="342900" indent="-342900">
-              <a:spcAft>
-                <a:spcPts val="1200"/>
-              </a:spcAft>
-              <a:buClr>
-                <a:schemeClr val="accent1"/>
-              </a:buClr>
-              <a:buFont typeface="Wingdings" panose="05000000000000000000" pitchFamily="2" charset="2"/>
-              <a:buChar char="§"/>
-            </a:pPr>
-            <a:r>
-              <a:rPr lang="de-DE" sz="2000" dirty="0">
-                <a:solidFill>
-                  <a:schemeClr val="bg1"/>
-                </a:solidFill>
-                <a:latin typeface="Klavika Light" panose="020B0506040000020004" pitchFamily="34" charset="0"/>
-              </a:rPr>
-              <a:t>Wie ist </a:t>
-            </a:r>
-          </a:p>
-          <a:p>
-            <a:pPr marL="342900" indent="-342900">
-              <a:spcAft>
-                <a:spcPts val="1200"/>
-              </a:spcAft>
-              <a:buClr>
-                <a:schemeClr val="accent1"/>
-              </a:buClr>
-              <a:buFont typeface="Wingdings" panose="05000000000000000000" pitchFamily="2" charset="2"/>
-              <a:buChar char="§"/>
-            </a:pPr>
-            <a:r>
-              <a:rPr lang="de-DE" sz="2000" dirty="0">
-                <a:solidFill>
-                  <a:schemeClr val="bg1"/>
-                </a:solidFill>
-                <a:latin typeface="Klavika Light" panose="020B0506040000020004" pitchFamily="34" charset="0"/>
-              </a:rPr>
-              <a:t>Integrierbar in statische Seiten</a:t>
-            </a:r>
-          </a:p>
-          <a:p>
-            <a:pPr marL="342900" indent="-342900">
-              <a:spcAft>
-                <a:spcPts val="1200"/>
-              </a:spcAft>
-              <a:buClr>
-                <a:schemeClr val="accent1"/>
-              </a:buClr>
-              <a:buFont typeface="Wingdings" panose="05000000000000000000" pitchFamily="2" charset="2"/>
-              <a:buChar char="§"/>
-            </a:pPr>
-            <a:r>
-              <a:rPr lang="de-DE" sz="2000" dirty="0">
-                <a:solidFill>
-                  <a:schemeClr val="bg1"/>
-                </a:solidFill>
-                <a:latin typeface="Klavika Light" panose="020B0506040000020004" pitchFamily="34" charset="0"/>
-              </a:rPr>
-              <a:t>Perfekt für </a:t>
-            </a:r>
-            <a:r>
-              <a:rPr lang="de-DE" sz="2000" dirty="0" err="1">
-                <a:solidFill>
-                  <a:schemeClr val="bg1"/>
-                </a:solidFill>
-                <a:latin typeface="Klavika Light" panose="020B0506040000020004" pitchFamily="34" charset="0"/>
-              </a:rPr>
-              <a:t>Wordpress</a:t>
-            </a:r>
-            <a:r>
-              <a:rPr lang="de-DE" sz="2000" dirty="0">
-                <a:solidFill>
-                  <a:schemeClr val="bg1"/>
-                </a:solidFill>
-                <a:latin typeface="Klavika Light" panose="020B0506040000020004" pitchFamily="34" charset="0"/>
-              </a:rPr>
-              <a:t>, Shopware, </a:t>
-            </a:r>
-            <a:r>
-              <a:rPr lang="de-DE" sz="2000" dirty="0" err="1">
-                <a:solidFill>
-                  <a:schemeClr val="bg1"/>
-                </a:solidFill>
-                <a:latin typeface="Klavika Light" panose="020B0506040000020004" pitchFamily="34" charset="0"/>
-              </a:rPr>
-              <a:t>Symfony</a:t>
-            </a:r>
-            <a:r>
-              <a:rPr lang="de-DE" sz="2000" dirty="0">
-                <a:solidFill>
-                  <a:schemeClr val="bg1"/>
-                </a:solidFill>
-                <a:latin typeface="Klavika Light" panose="020B0506040000020004" pitchFamily="34" charset="0"/>
-              </a:rPr>
-              <a:t> und </a:t>
-            </a:r>
-            <a:r>
-              <a:rPr lang="de-DE" sz="2000" dirty="0" err="1">
-                <a:solidFill>
-                  <a:schemeClr val="bg1"/>
-                </a:solidFill>
-                <a:latin typeface="Klavika Light" panose="020B0506040000020004" pitchFamily="34" charset="0"/>
-              </a:rPr>
-              <a:t>co.</a:t>
-            </a:r>
-            <a:endParaRPr lang="de-DE" sz="2000" dirty="0">
-              <a:solidFill>
-                <a:schemeClr val="bg1"/>
-              </a:solidFill>
-              <a:latin typeface="Klavika Light" panose="020B0506040000020004" pitchFamily="34" charset="0"/>
-            </a:endParaRPr>
-          </a:p>
-        </p:txBody>
-      </p:sp>
-    </p:spTree>
-    <p:extLst>
-      <p:ext uri="{BB962C8B-B14F-4D97-AF65-F5344CB8AC3E}">
-        <p14:creationId xmlns:p14="http://schemas.microsoft.com/office/powerpoint/2010/main" val="2200010199"/>
-      </p:ext>
-    </p:extLst>
-  </p:cSld>
-  <p:clrMapOvr>
-    <a:masterClrMapping/>
-  </p:clrMapOvr>
-</p:sld>
-</file>
-
 <file path=ppt/slides/slide2.xml><?xml version="1.0" encoding="utf-8"?>
 <p:sld xmlns:a="http://schemas.openxmlformats.org/drawingml/2006/main" xmlns:r="http://schemas.openxmlformats.org/officeDocument/2006/relationships" xmlns:p="http://schemas.openxmlformats.org/presentationml/2006/main">
   <p:cSld>

</xml_diff>